<commit_message>
updated index.html and presentation
</commit_message>
<xml_diff>
--- a/presentations/CW27CY2025_Research_Coursework.pptx
+++ b/presentations/CW27CY2025_Research_Coursework.pptx
@@ -13,6 +13,8 @@
     <p:sldId id="261" r:id="rId7"/>
     <p:sldId id="263" r:id="rId8"/>
     <p:sldId id="264" r:id="rId9"/>
+    <p:sldId id="266" r:id="rId10"/>
+    <p:sldId id="267" r:id="rId11"/>
   </p:sldIdLst>
   <p:sldSz cx="12192000" cy="6858000"/>
   <p:notesSz cx="6858000" cy="9144000"/>
@@ -268,7 +270,7 @@
           <a:p>
             <a:fld id="{C204EFBD-7AF0-4780-A26E-538745E2526B}" type="datetimeFigureOut">
               <a:rPr lang="en-IN" smtClean="0"/>
-              <a:t>13-08-2025</a:t>
+              <a:t>21-08-2025</a:t>
             </a:fld>
             <a:endParaRPr lang="en-IN"/>
           </a:p>
@@ -468,7 +470,7 @@
           <a:p>
             <a:fld id="{C204EFBD-7AF0-4780-A26E-538745E2526B}" type="datetimeFigureOut">
               <a:rPr lang="en-IN" smtClean="0"/>
-              <a:t>13-08-2025</a:t>
+              <a:t>21-08-2025</a:t>
             </a:fld>
             <a:endParaRPr lang="en-IN"/>
           </a:p>
@@ -678,7 +680,7 @@
           <a:p>
             <a:fld id="{C204EFBD-7AF0-4780-A26E-538745E2526B}" type="datetimeFigureOut">
               <a:rPr lang="en-IN" smtClean="0"/>
-              <a:t>13-08-2025</a:t>
+              <a:t>21-08-2025</a:t>
             </a:fld>
             <a:endParaRPr lang="en-IN"/>
           </a:p>
@@ -878,7 +880,7 @@
           <a:p>
             <a:fld id="{C204EFBD-7AF0-4780-A26E-538745E2526B}" type="datetimeFigureOut">
               <a:rPr lang="en-IN" smtClean="0"/>
-              <a:t>13-08-2025</a:t>
+              <a:t>21-08-2025</a:t>
             </a:fld>
             <a:endParaRPr lang="en-IN"/>
           </a:p>
@@ -1154,7 +1156,7 @@
           <a:p>
             <a:fld id="{C204EFBD-7AF0-4780-A26E-538745E2526B}" type="datetimeFigureOut">
               <a:rPr lang="en-IN" smtClean="0"/>
-              <a:t>13-08-2025</a:t>
+              <a:t>21-08-2025</a:t>
             </a:fld>
             <a:endParaRPr lang="en-IN"/>
           </a:p>
@@ -1422,7 +1424,7 @@
           <a:p>
             <a:fld id="{C204EFBD-7AF0-4780-A26E-538745E2526B}" type="datetimeFigureOut">
               <a:rPr lang="en-IN" smtClean="0"/>
-              <a:t>13-08-2025</a:t>
+              <a:t>21-08-2025</a:t>
             </a:fld>
             <a:endParaRPr lang="en-IN"/>
           </a:p>
@@ -1837,7 +1839,7 @@
           <a:p>
             <a:fld id="{C204EFBD-7AF0-4780-A26E-538745E2526B}" type="datetimeFigureOut">
               <a:rPr lang="en-IN" smtClean="0"/>
-              <a:t>13-08-2025</a:t>
+              <a:t>21-08-2025</a:t>
             </a:fld>
             <a:endParaRPr lang="en-IN"/>
           </a:p>
@@ -1979,7 +1981,7 @@
           <a:p>
             <a:fld id="{C204EFBD-7AF0-4780-A26E-538745E2526B}" type="datetimeFigureOut">
               <a:rPr lang="en-IN" smtClean="0"/>
-              <a:t>13-08-2025</a:t>
+              <a:t>21-08-2025</a:t>
             </a:fld>
             <a:endParaRPr lang="en-IN"/>
           </a:p>
@@ -2092,7 +2094,7 @@
           <a:p>
             <a:fld id="{C204EFBD-7AF0-4780-A26E-538745E2526B}" type="datetimeFigureOut">
               <a:rPr lang="en-IN" smtClean="0"/>
-              <a:t>13-08-2025</a:t>
+              <a:t>21-08-2025</a:t>
             </a:fld>
             <a:endParaRPr lang="en-IN"/>
           </a:p>
@@ -2405,7 +2407,7 @@
           <a:p>
             <a:fld id="{C204EFBD-7AF0-4780-A26E-538745E2526B}" type="datetimeFigureOut">
               <a:rPr lang="en-IN" smtClean="0"/>
-              <a:t>13-08-2025</a:t>
+              <a:t>21-08-2025</a:t>
             </a:fld>
             <a:endParaRPr lang="en-IN"/>
           </a:p>
@@ -2694,7 +2696,7 @@
           <a:p>
             <a:fld id="{C204EFBD-7AF0-4780-A26E-538745E2526B}" type="datetimeFigureOut">
               <a:rPr lang="en-IN" smtClean="0"/>
-              <a:t>13-08-2025</a:t>
+              <a:t>21-08-2025</a:t>
             </a:fld>
             <a:endParaRPr lang="en-IN"/>
           </a:p>
@@ -2937,7 +2939,7 @@
           <a:p>
             <a:fld id="{C204EFBD-7AF0-4780-A26E-538745E2526B}" type="datetimeFigureOut">
               <a:rPr lang="en-IN" smtClean="0"/>
-              <a:t>13-08-2025</a:t>
+              <a:t>21-08-2025</a:t>
             </a:fld>
             <a:endParaRPr lang="en-IN"/>
           </a:p>
@@ -3954,6 +3956,102 @@
     <p:extLst>
       <p:ext uri="{BB962C8B-B14F-4D97-AF65-F5344CB8AC3E}">
         <p14:creationId xmlns:p14="http://schemas.microsoft.com/office/powerpoint/2010/main" val="4011420106"/>
+      </p:ext>
+    </p:extLst>
+  </p:cSld>
+  <p:clrMapOvr>
+    <a:masterClrMapping/>
+  </p:clrMapOvr>
+</p:sld>
+</file>
+
+<file path=ppt/slides/slide10.xml><?xml version="1.0" encoding="utf-8"?>
+<p:sld xmlns:a="http://schemas.openxmlformats.org/drawingml/2006/main" xmlns:r="http://schemas.openxmlformats.org/officeDocument/2006/relationships" xmlns:p="http://schemas.openxmlformats.org/presentationml/2006/main">
+  <p:cSld>
+    <p:spTree>
+      <p:nvGrpSpPr>
+        <p:cNvPr id="1" name=""/>
+        <p:cNvGrpSpPr/>
+        <p:nvPr/>
+      </p:nvGrpSpPr>
+      <p:grpSpPr>
+        <a:xfrm>
+          <a:off x="0" y="0"/>
+          <a:ext cx="0" cy="0"/>
+          <a:chOff x="0" y="0"/>
+          <a:chExt cx="0" cy="0"/>
+        </a:xfrm>
+      </p:grpSpPr>
+      <p:sp>
+        <p:nvSpPr>
+          <p:cNvPr id="2" name="Title 1">
+            <a:extLst>
+              <a:ext uri="{FF2B5EF4-FFF2-40B4-BE49-F238E27FC236}">
+                <a16:creationId xmlns:a16="http://schemas.microsoft.com/office/drawing/2014/main" id="{9980F733-587A-445F-9B43-066FD9F697A0}"/>
+              </a:ext>
+            </a:extLst>
+          </p:cNvPr>
+          <p:cNvSpPr>
+            <a:spLocks noGrp="1"/>
+          </p:cNvSpPr>
+          <p:nvPr>
+            <p:ph type="title"/>
+          </p:nvPr>
+        </p:nvSpPr>
+        <p:spPr>
+          <a:xfrm>
+            <a:off x="838200" y="365125"/>
+            <a:ext cx="10515600" cy="701675"/>
+          </a:xfrm>
+        </p:spPr>
+        <p:txBody>
+          <a:bodyPr>
+            <a:normAutofit/>
+          </a:bodyPr>
+          <a:lstStyle/>
+          <a:p>
+            <a:r>
+              <a:rPr lang="en-US" sz="2600" b="1" u="sng" dirty="0"/>
+              <a:t>Solution/Implementation:</a:t>
+            </a:r>
+            <a:endParaRPr lang="en-IN" sz="2600" dirty="0"/>
+          </a:p>
+        </p:txBody>
+      </p:sp>
+      <p:sp>
+        <p:nvSpPr>
+          <p:cNvPr id="3" name="Content Placeholder 2">
+            <a:extLst>
+              <a:ext uri="{FF2B5EF4-FFF2-40B4-BE49-F238E27FC236}">
+                <a16:creationId xmlns:a16="http://schemas.microsoft.com/office/drawing/2014/main" id="{1C3540AF-AE76-202B-D2B4-B1EDA1AE0ACC}"/>
+              </a:ext>
+            </a:extLst>
+          </p:cNvPr>
+          <p:cNvSpPr>
+            <a:spLocks noGrp="1"/>
+          </p:cNvSpPr>
+          <p:nvPr>
+            <p:ph idx="1"/>
+          </p:nvPr>
+        </p:nvSpPr>
+        <p:spPr>
+          <a:xfrm>
+            <a:off x="838200" y="1188720"/>
+            <a:ext cx="10515600" cy="4988243"/>
+          </a:xfrm>
+        </p:spPr>
+        <p:txBody>
+          <a:bodyPr/>
+          <a:lstStyle/>
+          <a:p>
+            <a:endParaRPr lang="en-IN" dirty="0"/>
+          </a:p>
+        </p:txBody>
+      </p:sp>
+    </p:spTree>
+    <p:extLst>
+      <p:ext uri="{BB962C8B-B14F-4D97-AF65-F5344CB8AC3E}">
+        <p14:creationId xmlns:p14="http://schemas.microsoft.com/office/powerpoint/2010/main" val="3648544013"/>
       </p:ext>
     </p:extLst>
   </p:cSld>
@@ -8663,6 +8761,195 @@
 </p:sld>
 </file>
 
+<file path=ppt/slides/slide9.xml><?xml version="1.0" encoding="utf-8"?>
+<p:sld xmlns:a="http://schemas.openxmlformats.org/drawingml/2006/main" xmlns:r="http://schemas.openxmlformats.org/officeDocument/2006/relationships" xmlns:p="http://schemas.openxmlformats.org/presentationml/2006/main">
+  <p:cSld>
+    <p:spTree>
+      <p:nvGrpSpPr>
+        <p:cNvPr id="1" name=""/>
+        <p:cNvGrpSpPr/>
+        <p:nvPr/>
+      </p:nvGrpSpPr>
+      <p:grpSpPr>
+        <a:xfrm>
+          <a:off x="0" y="0"/>
+          <a:ext cx="0" cy="0"/>
+          <a:chOff x="0" y="0"/>
+          <a:chExt cx="0" cy="0"/>
+        </a:xfrm>
+      </p:grpSpPr>
+      <p:sp>
+        <p:nvSpPr>
+          <p:cNvPr id="2" name="Title 1">
+            <a:extLst>
+              <a:ext uri="{FF2B5EF4-FFF2-40B4-BE49-F238E27FC236}">
+                <a16:creationId xmlns:a16="http://schemas.microsoft.com/office/drawing/2014/main" id="{74C5BA04-C427-44E1-39BF-E0FF576677B9}"/>
+              </a:ext>
+            </a:extLst>
+          </p:cNvPr>
+          <p:cNvSpPr>
+            <a:spLocks noGrp="1"/>
+          </p:cNvSpPr>
+          <p:nvPr>
+            <p:ph type="title"/>
+          </p:nvPr>
+        </p:nvSpPr>
+        <p:spPr/>
+        <p:txBody>
+          <a:bodyPr>
+            <a:noAutofit/>
+          </a:bodyPr>
+          <a:lstStyle/>
+          <a:p>
+            <a:r>
+              <a:rPr lang="en-US" sz="3000" dirty="0"/>
+              <a:t>Paper - 4: Mobility-Aware Decentralized Federated Learning with Joint Optimization of Local Iteration and Leader Selection for Vehicular Networks</a:t>
+            </a:r>
+            <a:endParaRPr lang="en-IN" sz="3000" dirty="0"/>
+          </a:p>
+        </p:txBody>
+      </p:sp>
+      <p:sp>
+        <p:nvSpPr>
+          <p:cNvPr id="3" name="Content Placeholder 2">
+            <a:extLst>
+              <a:ext uri="{FF2B5EF4-FFF2-40B4-BE49-F238E27FC236}">
+                <a16:creationId xmlns:a16="http://schemas.microsoft.com/office/drawing/2014/main" id="{8740208C-DC31-DE2A-C424-73DACA6137E0}"/>
+              </a:ext>
+            </a:extLst>
+          </p:cNvPr>
+          <p:cNvSpPr>
+            <a:spLocks noGrp="1"/>
+          </p:cNvSpPr>
+          <p:nvPr>
+            <p:ph idx="1"/>
+          </p:nvPr>
+        </p:nvSpPr>
+        <p:spPr>
+          <a:xfrm>
+            <a:off x="838200" y="1798321"/>
+            <a:ext cx="7950200" cy="3901439"/>
+          </a:xfrm>
+        </p:spPr>
+        <p:txBody>
+          <a:bodyPr>
+            <a:normAutofit/>
+          </a:bodyPr>
+          <a:lstStyle/>
+          <a:p>
+            <a:pPr marL="0" indent="0">
+              <a:buNone/>
+            </a:pPr>
+            <a:r>
+              <a:rPr lang="en-US" sz="2000" b="1" u="sng" dirty="0"/>
+              <a:t>Problem:</a:t>
+            </a:r>
+          </a:p>
+          <a:p>
+            <a:pPr>
+              <a:buFont typeface="Wingdings" panose="05000000000000000000" pitchFamily="2" charset="2"/>
+              <a:buChar char="Ø"/>
+            </a:pPr>
+            <a:r>
+              <a:rPr lang="en-US" sz="1600" dirty="0"/>
+              <a:t>MDFL - Mobility-aware Decentralized Federated Learning Framework.</a:t>
+            </a:r>
+          </a:p>
+          <a:p>
+            <a:pPr marL="0" indent="0">
+              <a:buNone/>
+            </a:pPr>
+            <a:r>
+              <a:rPr lang="en-US" sz="1600" dirty="0"/>
+              <a:t> </a:t>
+            </a:r>
+            <a:r>
+              <a:rPr lang="en-US" sz="1600" dirty="0">
+                <a:sym typeface="Wingdings" panose="05000000000000000000" pitchFamily="2" charset="2"/>
+              </a:rPr>
+              <a:t>  Near by vehicles train FL model collaboratively and decentralized manner.</a:t>
+            </a:r>
+          </a:p>
+          <a:p>
+            <a:pPr>
+              <a:buFont typeface="Wingdings" panose="05000000000000000000" pitchFamily="2" charset="2"/>
+              <a:buChar char="Ø"/>
+            </a:pPr>
+            <a:r>
+              <a:rPr lang="en-US" sz="1600" dirty="0"/>
+              <a:t>Local iteration and leader selection joint optimization problem (LSOP) to improve the training efficiency of MDFL</a:t>
+            </a:r>
+          </a:p>
+          <a:p>
+            <a:pPr>
+              <a:buFont typeface="Wingdings" panose="05000000000000000000" pitchFamily="2" charset="2"/>
+              <a:buChar char="Ø"/>
+            </a:pPr>
+            <a:r>
+              <a:rPr lang="en-IN" sz="1600" dirty="0"/>
+              <a:t>For problem solving, we first reformulate LSOP as a decentralized partially observable Markov decision process (Dec-POMDP), and then develop an effective optimization algorithm based on multi-agent proximal policy optimization (MAPPO) to solve Dec-POMDP.</a:t>
+            </a:r>
+          </a:p>
+          <a:p>
+            <a:pPr>
+              <a:buFont typeface="Wingdings" panose="05000000000000000000" pitchFamily="2" charset="2"/>
+              <a:buChar char="Ø"/>
+            </a:pPr>
+            <a:r>
+              <a:rPr lang="en-IN" sz="1600" b="1" u="sng" dirty="0"/>
+              <a:t>Objective:  </a:t>
+            </a:r>
+            <a:r>
+              <a:rPr lang="en-US" sz="1600" dirty="0"/>
+              <a:t>we verify the performance of the proposed algorithm by comparing it with other algorithms</a:t>
+            </a:r>
+            <a:endParaRPr lang="en-IN" sz="1600" b="1" u="sng" dirty="0"/>
+          </a:p>
+        </p:txBody>
+      </p:sp>
+      <p:pic>
+        <p:nvPicPr>
+          <p:cNvPr id="5" name="Picture 4">
+            <a:extLst>
+              <a:ext uri="{FF2B5EF4-FFF2-40B4-BE49-F238E27FC236}">
+                <a16:creationId xmlns:a16="http://schemas.microsoft.com/office/drawing/2014/main" id="{D2F7FAF9-1A8A-96CD-8C0B-4CBEA9AB65F6}"/>
+              </a:ext>
+            </a:extLst>
+          </p:cNvPr>
+          <p:cNvPicPr>
+            <a:picLocks noChangeAspect="1"/>
+          </p:cNvPicPr>
+          <p:nvPr/>
+        </p:nvPicPr>
+        <p:blipFill>
+          <a:blip r:embed="rId2"/>
+          <a:stretch>
+            <a:fillRect/>
+          </a:stretch>
+        </p:blipFill>
+        <p:spPr>
+          <a:xfrm>
+            <a:off x="8680368" y="1424228"/>
+            <a:ext cx="3288112" cy="3070225"/>
+          </a:xfrm>
+          <a:prstGeom prst="rect">
+            <a:avLst/>
+          </a:prstGeom>
+        </p:spPr>
+      </p:pic>
+    </p:spTree>
+    <p:extLst>
+      <p:ext uri="{BB962C8B-B14F-4D97-AF65-F5344CB8AC3E}">
+        <p14:creationId xmlns:p14="http://schemas.microsoft.com/office/powerpoint/2010/main" val="1811336221"/>
+      </p:ext>
+    </p:extLst>
+  </p:cSld>
+  <p:clrMapOvr>
+    <a:masterClrMapping/>
+  </p:clrMapOvr>
+</p:sld>
+</file>
+
 <file path=ppt/theme/theme1.xml><?xml version="1.0" encoding="utf-8"?>
 <a:theme xmlns:a="http://schemas.openxmlformats.org/drawingml/2006/main" name="Office Theme">
   <a:themeElements>

</xml_diff>